<commit_message>
solution on/off 기능 추가
</commit_message>
<xml_diff>
--- a/ADMIN_UNION/document/Spider_통합_Admin_솔루션.pptx
+++ b/ADMIN_UNION/document/Spider_통합_Admin_솔루션.pptx
@@ -19215,7 +19215,7 @@
     <mc:Choice Requires="p14">
       <p:transition/>
     </mc:Choice>
-    <mc:Fallback xmlns="" xmlns:c="http://schemas.openxmlformats.org/drawingml/2006/chart" xmlns:dgm="http://schemas.openxmlformats.org/drawingml/2006/diagram" xmlns:dsp="http://schemas.microsoft.com/office/drawing/2008/diagram">
+    <mc:Fallback xmlns:dsp="http://schemas.microsoft.com/office/drawing/2008/diagram" xmlns:dgm="http://schemas.openxmlformats.org/drawingml/2006/diagram" xmlns:c="http://schemas.openxmlformats.org/drawingml/2006/chart" xmlns="">
       <p:transition/>
     </mc:Fallback>
   </mc:AlternateContent>
@@ -31751,7 +31751,7 @@
     <mc:Choice Requires="p14">
       <p:transition/>
     </mc:Choice>
-    <mc:Fallback xmlns="" xmlns:c="http://schemas.openxmlformats.org/drawingml/2006/chart" xmlns:dgm="http://schemas.openxmlformats.org/drawingml/2006/diagram" xmlns:dsp="http://schemas.microsoft.com/office/drawing/2008/diagram">
+    <mc:Fallback xmlns:dsp="http://schemas.microsoft.com/office/drawing/2008/diagram" xmlns:dgm="http://schemas.openxmlformats.org/drawingml/2006/diagram" xmlns:c="http://schemas.openxmlformats.org/drawingml/2006/chart" xmlns="">
       <p:transition/>
     </mc:Fallback>
   </mc:AlternateContent>
@@ -34714,12 +34714,8 @@
           <a:lstStyle/>
           <a:p>
             <a:r>
-              <a:rPr lang="en-US" altLang="ko-KR" dirty="0"/>
-              <a:t>Flow Control </a:t>
-            </a:r>
-            <a:r>
               <a:rPr lang="ko-KR" altLang="en-US" dirty="0"/>
-              <a:t>솔루션을 사용하지 않는 경우</a:t>
+              <a:t>특정 솔루션을 사용하지 않는 경우</a:t>
             </a:r>
           </a:p>
         </p:txBody>
@@ -34746,20 +34742,32 @@
           <a:lstStyle/>
           <a:p>
             <a:r>
+              <a:rPr lang="en-US" altLang="ko-KR" dirty="0" err="1"/>
+              <a:t>application.properties</a:t>
+            </a:r>
+            <a:r>
               <a:rPr lang="en-US" altLang="ko-KR" dirty="0"/>
-              <a:t>Flow Control </a:t>
+              <a:t> </a:t>
             </a:r>
             <a:r>
               <a:rPr lang="ko-KR" altLang="en-US" dirty="0"/>
-              <a:t>솔루션에서만 </a:t>
+              <a:t>파일에서 사용하는 솔루션은</a:t>
             </a:r>
             <a:r>
               <a:rPr lang="en-US" altLang="ko-KR" dirty="0"/>
-              <a:t>Redis</a:t>
+              <a:t> true, </a:t>
             </a:r>
             <a:r>
               <a:rPr lang="ko-KR" altLang="en-US" dirty="0"/>
-              <a:t>를 사용하므로 이를 사용하지 않는다면 해당 코드를 주석 처리</a:t>
+              <a:t>사용하지 않는 솔루션은 </a:t>
+            </a:r>
+            <a:r>
+              <a:rPr lang="en-US" altLang="ko-KR" dirty="0"/>
+              <a:t>false</a:t>
+            </a:r>
+            <a:r>
+              <a:rPr lang="ko-KR" altLang="en-US" dirty="0"/>
+              <a:t>로 설정</a:t>
             </a:r>
           </a:p>
         </p:txBody>
@@ -34861,14 +34869,14 @@
               <a:defRPr/>
             </a:pPr>
             <a:r>
-              <a:rPr lang="en-US" altLang="ko-KR" sz="1400" u="sng" dirty="0">
+              <a:rPr lang="en-US" altLang="ko-KR" sz="1400" u="sng" dirty="0" err="1">
                 <a:solidFill>
                   <a:schemeClr val="tx1"/>
                 </a:solidFill>
                 <a:latin typeface="맑은 고딕"/>
                 <a:ea typeface="맑은 고딕"/>
               </a:rPr>
-              <a:t>RedisConfig.java</a:t>
+              <a:t>application.properties</a:t>
             </a:r>
             <a:endParaRPr lang="ko-KR" altLang="en-US" sz="1400" u="sng" dirty="0">
               <a:solidFill>
@@ -35014,7 +35022,7 @@
                 <a:latin typeface="맑은 고딕"/>
                 <a:ea typeface="맑은 고딕"/>
               </a:rPr>
-              <a:t>Redis</a:t>
+              <a:t>false </a:t>
             </a:r>
             <a:r>
               <a:rPr kumimoji="1" lang="ko-KR" altLang="en-US" sz="1200" b="0" dirty="0">
@@ -35024,9 +35032,9 @@
                 <a:latin typeface="맑은 고딕"/>
                 <a:ea typeface="맑은 고딕"/>
               </a:rPr>
-              <a:t>를 실행하지 않아도 통합 </a:t>
-            </a:r>
-            <a:r>
+              <a:t>값을 주어서</a:t>
+            </a:r>
+            <a:br>
               <a:rPr kumimoji="1" lang="en-US" altLang="ko-KR" sz="1200" b="0" dirty="0">
                 <a:solidFill>
                   <a:schemeClr val="tx1"/>
@@ -35034,6 +35042,25 @@
                 <a:latin typeface="맑은 고딕"/>
                 <a:ea typeface="맑은 고딕"/>
               </a:rPr>
+            </a:br>
+            <a:r>
+              <a:rPr kumimoji="1" lang="ko-KR" altLang="en-US" sz="1200" b="0" dirty="0">
+                <a:solidFill>
+                  <a:schemeClr val="tx1"/>
+                </a:solidFill>
+                <a:latin typeface="맑은 고딕"/>
+                <a:ea typeface="맑은 고딕"/>
+              </a:rPr>
+              <a:t>통합 </a:t>
+            </a:r>
+            <a:r>
+              <a:rPr kumimoji="1" lang="en-US" altLang="ko-KR" sz="1200" b="0" dirty="0">
+                <a:solidFill>
+                  <a:schemeClr val="tx1"/>
+                </a:solidFill>
+                <a:latin typeface="맑은 고딕"/>
+                <a:ea typeface="맑은 고딕"/>
+              </a:rPr>
               <a:t>Admin</a:t>
             </a:r>
             <a:r>
@@ -35044,7 +35071,7 @@
                 <a:latin typeface="맑은 고딕"/>
                 <a:ea typeface="맑은 고딕"/>
               </a:rPr>
-              <a:t>을 사용할 수 있도록 주석 처리하는 것을 권장</a:t>
+              <a:t>이 문제 없이 동작하도록 설정</a:t>
             </a:r>
           </a:p>
         </p:txBody>
@@ -35244,10 +35271,10 @@
       </p:sp>
       <p:pic>
         <p:nvPicPr>
-          <p:cNvPr id="10" name="그림 9">
+          <p:cNvPr id="12" name="그림 11">
             <a:extLst>
               <a:ext uri="{FF2B5EF4-FFF2-40B4-BE49-F238E27FC236}">
-                <a16:creationId xmlns:a16="http://schemas.microsoft.com/office/drawing/2014/main" id="{AC5A2EDF-F5D3-FC1F-5370-D5ECD5EB8BD2}"/>
+                <a16:creationId xmlns:a16="http://schemas.microsoft.com/office/drawing/2014/main" id="{1AB63F4F-3031-1809-5519-5D1C76D225A1}"/>
               </a:ext>
             </a:extLst>
           </p:cNvPr>
@@ -35264,8 +35291,8 @@
         </p:blipFill>
         <p:spPr>
           <a:xfrm>
-            <a:off x="473501" y="2291112"/>
-            <a:ext cx="6484225" cy="3452722"/>
+            <a:off x="504153" y="2780813"/>
+            <a:ext cx="6419000" cy="2484392"/>
           </a:xfrm>
           <a:prstGeom prst="rect">
             <a:avLst/>
@@ -35274,10 +35301,10 @@
       </p:pic>
       <p:sp>
         <p:nvSpPr>
-          <p:cNvPr id="11" name="Oval 44">
+          <p:cNvPr id="13" name="Oval 44">
             <a:extLst>
               <a:ext uri="{FF2B5EF4-FFF2-40B4-BE49-F238E27FC236}">
-                <a16:creationId xmlns:a16="http://schemas.microsoft.com/office/drawing/2014/main" id="{B352BC0D-F60D-1D01-2552-A4CFEFA1E3D1}"/>
+                <a16:creationId xmlns:a16="http://schemas.microsoft.com/office/drawing/2014/main" id="{6520AA6B-AD79-F61E-946F-01F4B845E713}"/>
               </a:ext>
             </a:extLst>
           </p:cNvPr>
@@ -35286,7 +35313,7 @@
         </p:nvSpPr>
         <p:spPr>
           <a:xfrm>
-            <a:off x="2108684" y="4017473"/>
+            <a:off x="5385048" y="4401108"/>
             <a:ext cx="243027" cy="257173"/>
           </a:xfrm>
           <a:prstGeom prst="ellipse">
@@ -36712,7 +36739,7 @@
     <mc:Choice Requires="p14">
       <p:transition/>
     </mc:Choice>
-    <mc:Fallback xmlns="" xmlns:c="http://schemas.openxmlformats.org/drawingml/2006/chart" xmlns:dgm="http://schemas.openxmlformats.org/drawingml/2006/diagram" xmlns:dsp="http://schemas.microsoft.com/office/drawing/2008/diagram">
+    <mc:Fallback xmlns:dsp="http://schemas.microsoft.com/office/drawing/2008/diagram" xmlns:dgm="http://schemas.openxmlformats.org/drawingml/2006/diagram" xmlns:c="http://schemas.openxmlformats.org/drawingml/2006/chart" xmlns="">
       <p:transition/>
     </mc:Fallback>
   </mc:AlternateContent>
@@ -37295,7 +37322,7 @@
     <mc:Choice Requires="p14">
       <p:transition/>
     </mc:Choice>
-    <mc:Fallback xmlns:dsp="http://schemas.microsoft.com/office/drawing/2008/diagram" xmlns:dgm="http://schemas.openxmlformats.org/drawingml/2006/diagram" xmlns:c="http://schemas.openxmlformats.org/drawingml/2006/chart" xmlns="">
+    <mc:Fallback xmlns="" xmlns:c="http://schemas.openxmlformats.org/drawingml/2006/chart" xmlns:dgm="http://schemas.openxmlformats.org/drawingml/2006/diagram" xmlns:dsp="http://schemas.microsoft.com/office/drawing/2008/diagram">
       <p:transition/>
     </mc:Fallback>
   </mc:AlternateContent>
@@ -39130,7 +39157,7 @@
     <mc:Choice Requires="p14">
       <p:transition/>
     </mc:Choice>
-    <mc:Fallback xmlns:dsp="http://schemas.microsoft.com/office/drawing/2008/diagram" xmlns:dgm="http://schemas.openxmlformats.org/drawingml/2006/diagram" xmlns:c="http://schemas.openxmlformats.org/drawingml/2006/chart" xmlns="">
+    <mc:Fallback xmlns="" xmlns:c="http://schemas.openxmlformats.org/drawingml/2006/chart" xmlns:dgm="http://schemas.openxmlformats.org/drawingml/2006/diagram" xmlns:dsp="http://schemas.microsoft.com/office/drawing/2008/diagram">
       <p:transition/>
     </mc:Fallback>
   </mc:AlternateContent>
@@ -40754,7 +40781,7 @@
     <mc:Choice Requires="p14">
       <p:transition/>
     </mc:Choice>
-    <mc:Fallback xmlns:dsp="http://schemas.microsoft.com/office/drawing/2008/diagram" xmlns:dgm="http://schemas.openxmlformats.org/drawingml/2006/diagram" xmlns:c="http://schemas.openxmlformats.org/drawingml/2006/chart" xmlns="">
+    <mc:Fallback xmlns="" xmlns:c="http://schemas.openxmlformats.org/drawingml/2006/chart" xmlns:dgm="http://schemas.openxmlformats.org/drawingml/2006/diagram" xmlns:dsp="http://schemas.microsoft.com/office/drawing/2008/diagram">
       <p:transition/>
     </mc:Fallback>
   </mc:AlternateContent>

</xml_diff>